<commit_message>
Update Current Landscape Presentation.pptx
</commit_message>
<xml_diff>
--- a/Manuscripts & Presentations/Current Landscape Presentation.pptx
+++ b/Manuscripts & Presentations/Current Landscape Presentation.pptx
@@ -7,8 +7,11 @@
   <p:sldIdLst>
     <p:sldId id="256" r:id="rId2"/>
     <p:sldId id="263" r:id="rId3"/>
-    <p:sldId id="264" r:id="rId4"/>
-    <p:sldId id="265" r:id="rId5"/>
+    <p:sldId id="266" r:id="rId4"/>
+    <p:sldId id="264" r:id="rId5"/>
+    <p:sldId id="267" r:id="rId6"/>
+    <p:sldId id="265" r:id="rId7"/>
+    <p:sldId id="268" r:id="rId8"/>
   </p:sldIdLst>
   <p:sldSz cx="12192000" cy="6858000"/>
   <p:notesSz cx="6858000" cy="9144000"/>
@@ -118,16 +121,19 @@
         <p14:section name="Organizations" id="{10E3131E-31C6-2845-98D3-8C2C7A1F677C}">
           <p14:sldIdLst>
             <p14:sldId id="263"/>
+            <p14:sldId id="266"/>
           </p14:sldIdLst>
         </p14:section>
         <p14:section name="Corporations" id="{5882008D-48B4-DE48-AA0C-6909811AEB5E}">
           <p14:sldIdLst>
             <p14:sldId id="264"/>
+            <p14:sldId id="267"/>
           </p14:sldIdLst>
         </p14:section>
         <p14:section name="Open-Source Projects" id="{4DC90E72-6A24-8E4A-8986-2C8E737E7D8F}">
           <p14:sldIdLst>
             <p14:sldId id="265"/>
+            <p14:sldId id="268"/>
           </p14:sldIdLst>
         </p14:section>
       </p14:sectionLst>
@@ -3540,6 +3546,18 @@
               <a:t>Society for Imaging Informatics in Medicine</a:t>
             </a:r>
           </a:p>
+          <a:p>
+            <a:r>
+              <a:rPr lang="en-US" dirty="0"/>
+              <a:t>Developed 6 technical whitepapers for challenges in enterprise medical data, particularly surrounding medical images</a:t>
+            </a:r>
+          </a:p>
+          <a:p>
+            <a:r>
+              <a:rPr lang="en-US" dirty="0"/>
+              <a:t>Host yearly hackathons, workshops, and conferences</a:t>
+            </a:r>
+          </a:p>
         </p:txBody>
       </p:sp>
     </p:spTree>
@@ -3577,7 +3595,7 @@
           <p:cNvPr id="2" name="Title 1">
             <a:extLst>
               <a:ext uri="{FF2B5EF4-FFF2-40B4-BE49-F238E27FC236}">
-                <a16:creationId xmlns:a16="http://schemas.microsoft.com/office/drawing/2014/main" id="{D7402A6B-5D69-8616-7A21-6739942711BC}"/>
+                <a16:creationId xmlns:a16="http://schemas.microsoft.com/office/drawing/2014/main" id="{7A9CEA4B-28A2-65EC-2A60-B98F5EB7A65E}"/>
               </a:ext>
             </a:extLst>
           </p:cNvPr>
@@ -3595,7 +3613,7 @@
           <a:p>
             <a:r>
               <a:rPr lang="en-US" dirty="0"/>
-              <a:t>NextGen Healthcare</a:t>
+              <a:t>IHE: Integrating the Health Enterprise</a:t>
             </a:r>
           </a:p>
         </p:txBody>
@@ -3605,7 +3623,7 @@
           <p:cNvPr id="3" name="Content Placeholder 2">
             <a:extLst>
               <a:ext uri="{FF2B5EF4-FFF2-40B4-BE49-F238E27FC236}">
-                <a16:creationId xmlns:a16="http://schemas.microsoft.com/office/drawing/2014/main" id="{8369D4D8-38A4-5B40-369A-4433AF4770A2}"/>
+                <a16:creationId xmlns:a16="http://schemas.microsoft.com/office/drawing/2014/main" id="{2FAE25E5-7C68-7AAE-1871-67349963A2B9}"/>
               </a:ext>
             </a:extLst>
           </p:cNvPr>
@@ -3623,15 +3641,34 @@
           <a:p>
             <a:r>
               <a:rPr lang="en-US" dirty="0"/>
-              <a:t>https://</a:t>
+              <a:t>Initiative for healthcare individuals and organizations to improve computer systems integration in medical professions</a:t>
+            </a:r>
+          </a:p>
+          <a:p>
+            <a:r>
+              <a:rPr lang="en-US" dirty="0"/>
+              <a:t>More general and broad organization than HIMSS-SIIM</a:t>
+            </a:r>
+          </a:p>
+          <a:p>
+            <a:r>
+              <a:rPr lang="en-US" dirty="0"/>
+              <a:t>Established cross-enterprise document sharing (XDS) exchange standards</a:t>
+            </a:r>
+          </a:p>
+          <a:p>
+            <a:pPr lvl="1"/>
+            <a:r>
+              <a:rPr lang="en-US" dirty="0"/>
+              <a:t> XDS-</a:t>
             </a:r>
             <a:r>
               <a:rPr lang="en-US" dirty="0" err="1"/>
-              <a:t>www.nextgen.com</a:t>
+              <a:t>I.b</a:t>
             </a:r>
             <a:r>
               <a:rPr lang="en-US" dirty="0"/>
-              <a:t>/products-and-services/integration-engine</a:t>
+              <a:t> standard for medical image data sharing</a:t>
             </a:r>
           </a:p>
         </p:txBody>
@@ -3639,7 +3676,7 @@
     </p:spTree>
     <p:extLst>
       <p:ext uri="{BB962C8B-B14F-4D97-AF65-F5344CB8AC3E}">
-        <p14:creationId xmlns:p14="http://schemas.microsoft.com/office/powerpoint/2010/main" val="1955689811"/>
+        <p14:creationId xmlns:p14="http://schemas.microsoft.com/office/powerpoint/2010/main" val="3351995244"/>
       </p:ext>
     </p:extLst>
   </p:cSld>
@@ -3671,6 +3708,282 @@
           <p:cNvPr id="2" name="Title 1">
             <a:extLst>
               <a:ext uri="{FF2B5EF4-FFF2-40B4-BE49-F238E27FC236}">
+                <a16:creationId xmlns:a16="http://schemas.microsoft.com/office/drawing/2014/main" id="{D7402A6B-5D69-8616-7A21-6739942711BC}"/>
+              </a:ext>
+            </a:extLst>
+          </p:cNvPr>
+          <p:cNvSpPr>
+            <a:spLocks noGrp="1"/>
+          </p:cNvSpPr>
+          <p:nvPr>
+            <p:ph type="title"/>
+          </p:nvPr>
+        </p:nvSpPr>
+        <p:spPr/>
+        <p:txBody>
+          <a:bodyPr/>
+          <a:lstStyle/>
+          <a:p>
+            <a:r>
+              <a:rPr lang="en-US" dirty="0"/>
+              <a:t>Large corporations</a:t>
+            </a:r>
+          </a:p>
+        </p:txBody>
+      </p:sp>
+      <p:sp>
+        <p:nvSpPr>
+          <p:cNvPr id="3" name="Content Placeholder 2">
+            <a:extLst>
+              <a:ext uri="{FF2B5EF4-FFF2-40B4-BE49-F238E27FC236}">
+                <a16:creationId xmlns:a16="http://schemas.microsoft.com/office/drawing/2014/main" id="{8369D4D8-38A4-5B40-369A-4433AF4770A2}"/>
+              </a:ext>
+            </a:extLst>
+          </p:cNvPr>
+          <p:cNvSpPr>
+            <a:spLocks noGrp="1"/>
+          </p:cNvSpPr>
+          <p:nvPr>
+            <p:ph idx="1"/>
+          </p:nvPr>
+        </p:nvSpPr>
+        <p:spPr/>
+        <p:txBody>
+          <a:bodyPr/>
+          <a:lstStyle/>
+          <a:p>
+            <a:r>
+              <a:rPr lang="en-US" dirty="0"/>
+              <a:t>Microsoft Azure</a:t>
+            </a:r>
+          </a:p>
+          <a:p>
+            <a:pPr lvl="1"/>
+            <a:r>
+              <a:rPr lang="en-US" dirty="0"/>
+              <a:t>Offers cloud solutions for medical data storage and retrieval</a:t>
+            </a:r>
+          </a:p>
+          <a:p>
+            <a:r>
+              <a:rPr lang="en-US" dirty="0"/>
+              <a:t>Siemens</a:t>
+            </a:r>
+          </a:p>
+          <a:p>
+            <a:pPr lvl="1"/>
+            <a:r>
+              <a:rPr lang="en-US" dirty="0"/>
+              <a:t>Image sharing and archiving software following IHE XDS standards</a:t>
+            </a:r>
+          </a:p>
+          <a:p>
+            <a:pPr lvl="1"/>
+            <a:r>
+              <a:rPr lang="en-US" dirty="0"/>
+              <a:t>Integrates DICOM and HL7 standards</a:t>
+            </a:r>
+          </a:p>
+          <a:p>
+            <a:r>
+              <a:rPr lang="en-US" dirty="0"/>
+              <a:t>Phillips</a:t>
+            </a:r>
+          </a:p>
+          <a:p>
+            <a:pPr lvl="1"/>
+            <a:r>
+              <a:rPr lang="en-US" dirty="0"/>
+              <a:t>Enterprise image sharing and viewing software with IHE’s XDS standards profile</a:t>
+            </a:r>
+          </a:p>
+        </p:txBody>
+      </p:sp>
+    </p:spTree>
+    <p:extLst>
+      <p:ext uri="{BB962C8B-B14F-4D97-AF65-F5344CB8AC3E}">
+        <p14:creationId xmlns:p14="http://schemas.microsoft.com/office/powerpoint/2010/main" val="1955689811"/>
+      </p:ext>
+    </p:extLst>
+  </p:cSld>
+  <p:clrMapOvr>
+    <a:masterClrMapping/>
+  </p:clrMapOvr>
+</p:sld>
+</file>
+
+<file path=ppt/slides/slide5.xml><?xml version="1.0" encoding="utf-8"?>
+<p:sld xmlns:a="http://schemas.openxmlformats.org/drawingml/2006/main" xmlns:r="http://schemas.openxmlformats.org/officeDocument/2006/relationships" xmlns:p="http://schemas.openxmlformats.org/presentationml/2006/main">
+  <p:cSld>
+    <p:spTree>
+      <p:nvGrpSpPr>
+        <p:cNvPr id="1" name=""/>
+        <p:cNvGrpSpPr/>
+        <p:nvPr/>
+      </p:nvGrpSpPr>
+      <p:grpSpPr>
+        <a:xfrm>
+          <a:off x="0" y="0"/>
+          <a:ext cx="0" cy="0"/>
+          <a:chOff x="0" y="0"/>
+          <a:chExt cx="0" cy="0"/>
+        </a:xfrm>
+      </p:grpSpPr>
+      <p:sp>
+        <p:nvSpPr>
+          <p:cNvPr id="2" name="Title 1">
+            <a:extLst>
+              <a:ext uri="{FF2B5EF4-FFF2-40B4-BE49-F238E27FC236}">
+                <a16:creationId xmlns:a16="http://schemas.microsoft.com/office/drawing/2014/main" id="{1061B40A-CD07-68C8-8A34-C2FCD30F1A38}"/>
+              </a:ext>
+            </a:extLst>
+          </p:cNvPr>
+          <p:cNvSpPr>
+            <a:spLocks noGrp="1"/>
+          </p:cNvSpPr>
+          <p:nvPr>
+            <p:ph type="title"/>
+          </p:nvPr>
+        </p:nvSpPr>
+        <p:spPr/>
+        <p:txBody>
+          <a:bodyPr/>
+          <a:lstStyle/>
+          <a:p>
+            <a:r>
+              <a:rPr lang="en-US" dirty="0"/>
+              <a:t>Small start-ups</a:t>
+            </a:r>
+          </a:p>
+        </p:txBody>
+      </p:sp>
+      <p:sp>
+        <p:nvSpPr>
+          <p:cNvPr id="3" name="Content Placeholder 2">
+            <a:extLst>
+              <a:ext uri="{FF2B5EF4-FFF2-40B4-BE49-F238E27FC236}">
+                <a16:creationId xmlns:a16="http://schemas.microsoft.com/office/drawing/2014/main" id="{00FE79ED-FB90-5A52-E6B9-A854CE932C1E}"/>
+              </a:ext>
+            </a:extLst>
+          </p:cNvPr>
+          <p:cNvSpPr>
+            <a:spLocks noGrp="1"/>
+          </p:cNvSpPr>
+          <p:nvPr>
+            <p:ph idx="1"/>
+          </p:nvPr>
+        </p:nvSpPr>
+        <p:spPr/>
+        <p:txBody>
+          <a:bodyPr/>
+          <a:lstStyle/>
+          <a:p>
+            <a:r>
+              <a:rPr lang="en-US" dirty="0"/>
+              <a:t>NextGen Healthcare</a:t>
+            </a:r>
+          </a:p>
+          <a:p>
+            <a:pPr lvl="1"/>
+            <a:r>
+              <a:rPr lang="en-US" dirty="0"/>
+              <a:t>Offers open-source GitHub repo for handling HL7 medical data</a:t>
+            </a:r>
+          </a:p>
+          <a:p>
+            <a:pPr lvl="1"/>
+            <a:r>
+              <a:rPr lang="en-US" dirty="0"/>
+              <a:t>Premium software service with FHIR compatibility and “interoperability”</a:t>
+            </a:r>
+          </a:p>
+          <a:p>
+            <a:r>
+              <a:rPr lang="en-US" dirty="0" err="1"/>
+              <a:t>PostDICOM</a:t>
+            </a:r>
+            <a:endParaRPr lang="en-US" dirty="0"/>
+          </a:p>
+          <a:p>
+            <a:pPr lvl="1"/>
+            <a:r>
+              <a:rPr lang="en-US" dirty="0"/>
+              <a:t>Medical image data sharing &amp; viewing for individuals and small physicians</a:t>
+            </a:r>
+          </a:p>
+          <a:p>
+            <a:pPr lvl="1"/>
+            <a:r>
+              <a:rPr lang="en-US" dirty="0"/>
+              <a:t>Offers web interface for data anonymization</a:t>
+            </a:r>
+          </a:p>
+          <a:p>
+            <a:r>
+              <a:rPr lang="en-US" dirty="0" err="1"/>
+              <a:t>Vaultara</a:t>
+            </a:r>
+            <a:r>
+              <a:rPr lang="en-US" dirty="0"/>
+              <a:t>, Nuance, </a:t>
+            </a:r>
+            <a:r>
+              <a:rPr lang="en-US" dirty="0" err="1"/>
+              <a:t>ShareMedix</a:t>
+            </a:r>
+            <a:endParaRPr lang="en-US" dirty="0"/>
+          </a:p>
+          <a:p>
+            <a:pPr lvl="1"/>
+            <a:r>
+              <a:rPr lang="en-US" dirty="0"/>
+              <a:t>All offer a data sharing platform for medical images</a:t>
+            </a:r>
+          </a:p>
+          <a:p>
+            <a:pPr lvl="1"/>
+            <a:r>
+              <a:rPr lang="en-US" dirty="0"/>
+              <a:t>Unclear on the level of interoperability between members outside the same hospital network</a:t>
+            </a:r>
+          </a:p>
+        </p:txBody>
+      </p:sp>
+    </p:spTree>
+    <p:extLst>
+      <p:ext uri="{BB962C8B-B14F-4D97-AF65-F5344CB8AC3E}">
+        <p14:creationId xmlns:p14="http://schemas.microsoft.com/office/powerpoint/2010/main" val="3756194735"/>
+      </p:ext>
+    </p:extLst>
+  </p:cSld>
+  <p:clrMapOvr>
+    <a:masterClrMapping/>
+  </p:clrMapOvr>
+</p:sld>
+</file>
+
+<file path=ppt/slides/slide6.xml><?xml version="1.0" encoding="utf-8"?>
+<p:sld xmlns:a="http://schemas.openxmlformats.org/drawingml/2006/main" xmlns:r="http://schemas.openxmlformats.org/officeDocument/2006/relationships" xmlns:p="http://schemas.openxmlformats.org/presentationml/2006/main">
+  <p:cSld>
+    <p:spTree>
+      <p:nvGrpSpPr>
+        <p:cNvPr id="1" name=""/>
+        <p:cNvGrpSpPr/>
+        <p:nvPr/>
+      </p:nvGrpSpPr>
+      <p:grpSpPr>
+        <a:xfrm>
+          <a:off x="0" y="0"/>
+          <a:ext cx="0" cy="0"/>
+          <a:chOff x="0" y="0"/>
+          <a:chExt cx="0" cy="0"/>
+        </a:xfrm>
+      </p:grpSpPr>
+      <p:sp>
+        <p:nvSpPr>
+          <p:cNvPr id="2" name="Title 1">
+            <a:extLst>
+              <a:ext uri="{FF2B5EF4-FFF2-40B4-BE49-F238E27FC236}">
                 <a16:creationId xmlns:a16="http://schemas.microsoft.com/office/drawing/2014/main" id="{D3DC4A56-9FD6-0C11-FC14-CAF692CCD97B}"/>
               </a:ext>
             </a:extLst>
@@ -3687,7 +4000,10 @@
           <a:bodyPr/>
           <a:lstStyle/>
           <a:p>
-            <a:endParaRPr lang="en-US" dirty="0"/>
+            <a:r>
+              <a:rPr lang="en-US" dirty="0"/>
+              <a:t>National Cancer Institute – Blockchain for Medical Image Sharing</a:t>
+            </a:r>
           </a:p>
         </p:txBody>
       </p:sp>
@@ -3712,7 +4028,24 @@
           <a:bodyPr/>
           <a:lstStyle/>
           <a:p>
-            <a:endParaRPr lang="en-US"/>
+            <a:r>
+              <a:rPr lang="en-US" dirty="0"/>
+              <a:t>PI: Professor </a:t>
+            </a:r>
+            <a:r>
+              <a:rPr lang="en-US" dirty="0" err="1"/>
+              <a:t>Jianjing</a:t>
+            </a:r>
+            <a:r>
+              <a:rPr lang="en-US" dirty="0"/>
+              <a:t> Li</a:t>
+            </a:r>
+          </a:p>
+          <a:p>
+            <a:r>
+              <a:rPr lang="en-US" dirty="0"/>
+              <a:t>” The project aims to build a blockchain-based information system for medical image sharing between different entities, particularly facilitating image transfer to enable a data library of medical images for an AI/ML application to improve image processing, analysis, reconstruction, and enhancement. We plan to test the system with real image data and assess its performance from a socioeconomic perspective.”</a:t>
+            </a:r>
           </a:p>
         </p:txBody>
       </p:sp>
@@ -3720,6 +4053,142 @@
     <p:extLst>
       <p:ext uri="{BB962C8B-B14F-4D97-AF65-F5344CB8AC3E}">
         <p14:creationId xmlns:p14="http://schemas.microsoft.com/office/powerpoint/2010/main" val="1198368807"/>
+      </p:ext>
+    </p:extLst>
+  </p:cSld>
+  <p:clrMapOvr>
+    <a:masterClrMapping/>
+  </p:clrMapOvr>
+</p:sld>
+</file>
+
+<file path=ppt/slides/slide7.xml><?xml version="1.0" encoding="utf-8"?>
+<p:sld xmlns:a="http://schemas.openxmlformats.org/drawingml/2006/main" xmlns:r="http://schemas.openxmlformats.org/officeDocument/2006/relationships" xmlns:p="http://schemas.openxmlformats.org/presentationml/2006/main">
+  <p:cSld>
+    <p:spTree>
+      <p:nvGrpSpPr>
+        <p:cNvPr id="1" name=""/>
+        <p:cNvGrpSpPr/>
+        <p:nvPr/>
+      </p:nvGrpSpPr>
+      <p:grpSpPr>
+        <a:xfrm>
+          <a:off x="0" y="0"/>
+          <a:ext cx="0" cy="0"/>
+          <a:chOff x="0" y="0"/>
+          <a:chExt cx="0" cy="0"/>
+        </a:xfrm>
+      </p:grpSpPr>
+      <p:sp>
+        <p:nvSpPr>
+          <p:cNvPr id="2" name="Title 1">
+            <a:extLst>
+              <a:ext uri="{FF2B5EF4-FFF2-40B4-BE49-F238E27FC236}">
+                <a16:creationId xmlns:a16="http://schemas.microsoft.com/office/drawing/2014/main" id="{135E737A-7F79-0186-56F5-834DCFBF3C89}"/>
+              </a:ext>
+            </a:extLst>
+          </p:cNvPr>
+          <p:cNvSpPr>
+            <a:spLocks noGrp="1"/>
+          </p:cNvSpPr>
+          <p:nvPr>
+            <p:ph type="title"/>
+          </p:nvPr>
+        </p:nvSpPr>
+        <p:spPr/>
+        <p:txBody>
+          <a:bodyPr/>
+          <a:lstStyle/>
+          <a:p>
+            <a:r>
+              <a:rPr lang="en-US" dirty="0"/>
+              <a:t>Blockchain-based Protocols</a:t>
+            </a:r>
+          </a:p>
+        </p:txBody>
+      </p:sp>
+      <p:sp>
+        <p:nvSpPr>
+          <p:cNvPr id="3" name="Content Placeholder 2">
+            <a:extLst>
+              <a:ext uri="{FF2B5EF4-FFF2-40B4-BE49-F238E27FC236}">
+                <a16:creationId xmlns:a16="http://schemas.microsoft.com/office/drawing/2014/main" id="{FFB44FE7-2F28-4F0F-3C96-1F1DA7B3A6CB}"/>
+              </a:ext>
+            </a:extLst>
+          </p:cNvPr>
+          <p:cNvSpPr>
+            <a:spLocks noGrp="1"/>
+          </p:cNvSpPr>
+          <p:nvPr>
+            <p:ph idx="1"/>
+          </p:nvPr>
+        </p:nvSpPr>
+        <p:spPr/>
+        <p:txBody>
+          <a:bodyPr>
+            <a:normAutofit lnSpcReduction="10000"/>
+          </a:bodyPr>
+          <a:lstStyle/>
+          <a:p>
+            <a:r>
+              <a:rPr lang="en-US" dirty="0" err="1"/>
+              <a:t>MedRec</a:t>
+            </a:r>
+            <a:endParaRPr lang="en-US" dirty="0"/>
+          </a:p>
+          <a:p>
+            <a:pPr lvl="1"/>
+            <a:r>
+              <a:rPr lang="en-US" dirty="0"/>
+              <a:t>Blockchain system for transfer of medical data from distributed systems to  unified patient EHR</a:t>
+            </a:r>
+          </a:p>
+          <a:p>
+            <a:r>
+              <a:rPr lang="en-US" dirty="0"/>
+              <a:t>EHR4CR</a:t>
+            </a:r>
+          </a:p>
+          <a:p>
+            <a:pPr lvl="1"/>
+            <a:r>
+              <a:rPr lang="en-US" dirty="0"/>
+              <a:t>EU implemented protocol for sharing medical data with clinical researchers</a:t>
+            </a:r>
+          </a:p>
+          <a:p>
+            <a:r>
+              <a:rPr lang="en-US" dirty="0"/>
+              <a:t>MIFS</a:t>
+            </a:r>
+          </a:p>
+          <a:p>
+            <a:pPr lvl="1"/>
+            <a:r>
+              <a:rPr lang="en-US" dirty="0"/>
+              <a:t>Blockchain protocol for storing and sharing medical images cross hospitals using an access-control scheme</a:t>
+            </a:r>
+          </a:p>
+          <a:p>
+            <a:r>
+              <a:rPr lang="en-US" dirty="0" err="1"/>
+              <a:t>EHRChain</a:t>
+            </a:r>
+            <a:endParaRPr lang="en-US" dirty="0"/>
+          </a:p>
+          <a:p>
+            <a:pPr lvl="1"/>
+            <a:r>
+              <a:rPr lang="en-US" dirty="0"/>
+              <a:t>Blockchain framework to overcome existing barriers in blockchain-based EHR solutions</a:t>
+            </a:r>
+          </a:p>
+        </p:txBody>
+      </p:sp>
+    </p:spTree>
+    <p:extLst>
+      <p:ext uri="{BB962C8B-B14F-4D97-AF65-F5344CB8AC3E}">
+        <p14:creationId xmlns:p14="http://schemas.microsoft.com/office/powerpoint/2010/main" val="502493145"/>
       </p:ext>
     </p:extLst>
   </p:cSld>

</xml_diff>